<commit_message>
finalized ppt, added scatterplots
</commit_message>
<xml_diff>
--- a/Wine Quality Analysis_Final.pptx
+++ b/Wine Quality Analysis_Final.pptx
@@ -5,7 +5,7 @@
     <p:sldMasterId id="2147483659" r:id="rId1"/>
   </p:sldMasterIdLst>
   <p:notesMasterIdLst>
-    <p:notesMasterId r:id="rId11"/>
+    <p:notesMasterId r:id="rId18"/>
   </p:notesMasterIdLst>
   <p:sldIdLst>
     <p:sldId id="256" r:id="rId2"/>
@@ -14,9 +14,16 @@
     <p:sldId id="258" r:id="rId5"/>
     <p:sldId id="259" r:id="rId6"/>
     <p:sldId id="260" r:id="rId7"/>
-    <p:sldId id="261" r:id="rId8"/>
-    <p:sldId id="263" r:id="rId9"/>
-    <p:sldId id="264" r:id="rId10"/>
+    <p:sldId id="265" r:id="rId8"/>
+    <p:sldId id="271" r:id="rId9"/>
+    <p:sldId id="266" r:id="rId10"/>
+    <p:sldId id="267" r:id="rId11"/>
+    <p:sldId id="268" r:id="rId12"/>
+    <p:sldId id="269" r:id="rId13"/>
+    <p:sldId id="270" r:id="rId14"/>
+    <p:sldId id="261" r:id="rId15"/>
+    <p:sldId id="263" r:id="rId16"/>
+    <p:sldId id="264" r:id="rId17"/>
   </p:sldIdLst>
   <p:sldSz cx="9144000" cy="5143500" type="screen16x9"/>
   <p:notesSz cx="6858000" cy="9144000"/>
@@ -6124,6 +6131,1146 @@
 </p:sld>
 </file>
 
+<file path=ppt/slides/slide10.xml><?xml version="1.0" encoding="utf-8"?>
+<p:sld xmlns:a="http://schemas.openxmlformats.org/drawingml/2006/main" xmlns:r="http://schemas.openxmlformats.org/officeDocument/2006/relationships" xmlns:p="http://schemas.openxmlformats.org/presentationml/2006/main">
+  <p:cSld>
+    <p:spTree>
+      <p:nvGrpSpPr>
+        <p:cNvPr id="1" name=""/>
+        <p:cNvGrpSpPr/>
+        <p:nvPr/>
+      </p:nvGrpSpPr>
+      <p:grpSpPr>
+        <a:xfrm>
+          <a:off x="0" y="0"/>
+          <a:ext cx="0" cy="0"/>
+          <a:chOff x="0" y="0"/>
+          <a:chExt cx="0" cy="0"/>
+        </a:xfrm>
+      </p:grpSpPr>
+      <p:pic>
+        <p:nvPicPr>
+          <p:cNvPr id="5" name="Picture 4">
+            <a:extLst>
+              <a:ext uri="{FF2B5EF4-FFF2-40B4-BE49-F238E27FC236}">
+                <a16:creationId xmlns:a16="http://schemas.microsoft.com/office/drawing/2014/main" id="{9159EE28-9C5C-5B43-9A26-0C5D09D4384F}"/>
+              </a:ext>
+            </a:extLst>
+          </p:cNvPr>
+          <p:cNvPicPr>
+            <a:picLocks noChangeAspect="1"/>
+          </p:cNvPicPr>
+          <p:nvPr/>
+        </p:nvPicPr>
+        <p:blipFill>
+          <a:blip r:embed="rId2"/>
+          <a:stretch>
+            <a:fillRect/>
+          </a:stretch>
+        </p:blipFill>
+        <p:spPr>
+          <a:xfrm>
+            <a:off x="1828800" y="512362"/>
+            <a:ext cx="5486400" cy="3657600"/>
+          </a:xfrm>
+          <a:prstGeom prst="rect">
+            <a:avLst/>
+          </a:prstGeom>
+        </p:spPr>
+      </p:pic>
+    </p:spTree>
+    <p:extLst>
+      <p:ext uri="{BB962C8B-B14F-4D97-AF65-F5344CB8AC3E}">
+        <p14:creationId xmlns:p14="http://schemas.microsoft.com/office/powerpoint/2010/main" val="3110951791"/>
+      </p:ext>
+    </p:extLst>
+  </p:cSld>
+  <p:clrMapOvr>
+    <a:masterClrMapping/>
+  </p:clrMapOvr>
+</p:sld>
+</file>
+
+<file path=ppt/slides/slide11.xml><?xml version="1.0" encoding="utf-8"?>
+<p:sld xmlns:a="http://schemas.openxmlformats.org/drawingml/2006/main" xmlns:r="http://schemas.openxmlformats.org/officeDocument/2006/relationships" xmlns:p="http://schemas.openxmlformats.org/presentationml/2006/main">
+  <p:cSld>
+    <p:spTree>
+      <p:nvGrpSpPr>
+        <p:cNvPr id="1" name=""/>
+        <p:cNvGrpSpPr/>
+        <p:nvPr/>
+      </p:nvGrpSpPr>
+      <p:grpSpPr>
+        <a:xfrm>
+          <a:off x="0" y="0"/>
+          <a:ext cx="0" cy="0"/>
+          <a:chOff x="0" y="0"/>
+          <a:chExt cx="0" cy="0"/>
+        </a:xfrm>
+      </p:grpSpPr>
+      <p:pic>
+        <p:nvPicPr>
+          <p:cNvPr id="3" name="Picture 2">
+            <a:extLst>
+              <a:ext uri="{FF2B5EF4-FFF2-40B4-BE49-F238E27FC236}">
+                <a16:creationId xmlns:a16="http://schemas.microsoft.com/office/drawing/2014/main" id="{1B73CDB4-AA20-C643-88A3-E8E92B0B9890}"/>
+              </a:ext>
+            </a:extLst>
+          </p:cNvPr>
+          <p:cNvPicPr>
+            <a:picLocks noChangeAspect="1"/>
+          </p:cNvPicPr>
+          <p:nvPr/>
+        </p:nvPicPr>
+        <p:blipFill>
+          <a:blip r:embed="rId2"/>
+          <a:stretch>
+            <a:fillRect/>
+          </a:stretch>
+        </p:blipFill>
+        <p:spPr>
+          <a:xfrm>
+            <a:off x="1828800" y="480557"/>
+            <a:ext cx="5486400" cy="3657600"/>
+          </a:xfrm>
+          <a:prstGeom prst="rect">
+            <a:avLst/>
+          </a:prstGeom>
+        </p:spPr>
+      </p:pic>
+    </p:spTree>
+    <p:extLst>
+      <p:ext uri="{BB962C8B-B14F-4D97-AF65-F5344CB8AC3E}">
+        <p14:creationId xmlns:p14="http://schemas.microsoft.com/office/powerpoint/2010/main" val="2273937256"/>
+      </p:ext>
+    </p:extLst>
+  </p:cSld>
+  <p:clrMapOvr>
+    <a:masterClrMapping/>
+  </p:clrMapOvr>
+</p:sld>
+</file>
+
+<file path=ppt/slides/slide12.xml><?xml version="1.0" encoding="utf-8"?>
+<p:sld xmlns:a="http://schemas.openxmlformats.org/drawingml/2006/main" xmlns:r="http://schemas.openxmlformats.org/officeDocument/2006/relationships" xmlns:p="http://schemas.openxmlformats.org/presentationml/2006/main">
+  <p:cSld>
+    <p:spTree>
+      <p:nvGrpSpPr>
+        <p:cNvPr id="1" name=""/>
+        <p:cNvGrpSpPr/>
+        <p:nvPr/>
+      </p:nvGrpSpPr>
+      <p:grpSpPr>
+        <a:xfrm>
+          <a:off x="0" y="0"/>
+          <a:ext cx="0" cy="0"/>
+          <a:chOff x="0" y="0"/>
+          <a:chExt cx="0" cy="0"/>
+        </a:xfrm>
+      </p:grpSpPr>
+      <p:pic>
+        <p:nvPicPr>
+          <p:cNvPr id="3" name="Picture 2">
+            <a:extLst>
+              <a:ext uri="{FF2B5EF4-FFF2-40B4-BE49-F238E27FC236}">
+                <a16:creationId xmlns:a16="http://schemas.microsoft.com/office/drawing/2014/main" id="{FA8B47ED-BC24-B34D-995F-813A857EF056}"/>
+              </a:ext>
+            </a:extLst>
+          </p:cNvPr>
+          <p:cNvPicPr>
+            <a:picLocks noChangeAspect="1"/>
+          </p:cNvPicPr>
+          <p:nvPr/>
+        </p:nvPicPr>
+        <p:blipFill>
+          <a:blip r:embed="rId2"/>
+          <a:stretch>
+            <a:fillRect/>
+          </a:stretch>
+        </p:blipFill>
+        <p:spPr>
+          <a:xfrm>
+            <a:off x="1828800" y="337433"/>
+            <a:ext cx="5486400" cy="3657600"/>
+          </a:xfrm>
+          <a:prstGeom prst="rect">
+            <a:avLst/>
+          </a:prstGeom>
+        </p:spPr>
+      </p:pic>
+    </p:spTree>
+    <p:extLst>
+      <p:ext uri="{BB962C8B-B14F-4D97-AF65-F5344CB8AC3E}">
+        <p14:creationId xmlns:p14="http://schemas.microsoft.com/office/powerpoint/2010/main" val="2823473004"/>
+      </p:ext>
+    </p:extLst>
+  </p:cSld>
+  <p:clrMapOvr>
+    <a:masterClrMapping/>
+  </p:clrMapOvr>
+</p:sld>
+</file>
+
+<file path=ppt/slides/slide13.xml><?xml version="1.0" encoding="utf-8"?>
+<p:sld xmlns:a="http://schemas.openxmlformats.org/drawingml/2006/main" xmlns:r="http://schemas.openxmlformats.org/officeDocument/2006/relationships" xmlns:p="http://schemas.openxmlformats.org/presentationml/2006/main">
+  <p:cSld>
+    <p:spTree>
+      <p:nvGrpSpPr>
+        <p:cNvPr id="1" name=""/>
+        <p:cNvGrpSpPr/>
+        <p:nvPr/>
+      </p:nvGrpSpPr>
+      <p:grpSpPr>
+        <a:xfrm>
+          <a:off x="0" y="0"/>
+          <a:ext cx="0" cy="0"/>
+          <a:chOff x="0" y="0"/>
+          <a:chExt cx="0" cy="0"/>
+        </a:xfrm>
+      </p:grpSpPr>
+      <p:pic>
+        <p:nvPicPr>
+          <p:cNvPr id="3" name="Picture 2">
+            <a:extLst>
+              <a:ext uri="{FF2B5EF4-FFF2-40B4-BE49-F238E27FC236}">
+                <a16:creationId xmlns:a16="http://schemas.microsoft.com/office/drawing/2014/main" id="{2A8961D8-2EEF-0548-B053-DFC1259B7604}"/>
+              </a:ext>
+            </a:extLst>
+          </p:cNvPr>
+          <p:cNvPicPr>
+            <a:picLocks noChangeAspect="1"/>
+          </p:cNvPicPr>
+          <p:nvPr/>
+        </p:nvPicPr>
+        <p:blipFill>
+          <a:blip r:embed="rId2"/>
+          <a:stretch>
+            <a:fillRect/>
+          </a:stretch>
+        </p:blipFill>
+        <p:spPr>
+          <a:xfrm>
+            <a:off x="1828800" y="432850"/>
+            <a:ext cx="5486400" cy="3657600"/>
+          </a:xfrm>
+          <a:prstGeom prst="rect">
+            <a:avLst/>
+          </a:prstGeom>
+        </p:spPr>
+      </p:pic>
+    </p:spTree>
+    <p:extLst>
+      <p:ext uri="{BB962C8B-B14F-4D97-AF65-F5344CB8AC3E}">
+        <p14:creationId xmlns:p14="http://schemas.microsoft.com/office/powerpoint/2010/main" val="2778478936"/>
+      </p:ext>
+    </p:extLst>
+  </p:cSld>
+  <p:clrMapOvr>
+    <a:masterClrMapping/>
+  </p:clrMapOvr>
+</p:sld>
+</file>
+
+<file path=ppt/slides/slide14.xml><?xml version="1.0" encoding="utf-8"?>
+<p:sld xmlns:a="http://schemas.openxmlformats.org/drawingml/2006/main" xmlns:r="http://schemas.openxmlformats.org/officeDocument/2006/relationships" xmlns:p="http://schemas.openxmlformats.org/presentationml/2006/main">
+  <p:cSld>
+    <p:spTree>
+      <p:nvGrpSpPr>
+        <p:cNvPr id="1" name="Shape 85"/>
+        <p:cNvGrpSpPr/>
+        <p:nvPr/>
+      </p:nvGrpSpPr>
+      <p:grpSpPr>
+        <a:xfrm>
+          <a:off x="0" y="0"/>
+          <a:ext cx="0" cy="0"/>
+          <a:chOff x="0" y="0"/>
+          <a:chExt cx="0" cy="0"/>
+        </a:xfrm>
+      </p:grpSpPr>
+      <p:sp>
+        <p:nvSpPr>
+          <p:cNvPr id="86" name="Google Shape;86;p18"/>
+          <p:cNvSpPr/>
+          <p:nvPr/>
+        </p:nvSpPr>
+        <p:spPr>
+          <a:xfrm>
+            <a:off x="0" y="0"/>
+            <a:ext cx="9144000" cy="463800"/>
+          </a:xfrm>
+          <a:prstGeom prst="rect">
+            <a:avLst/>
+          </a:prstGeom>
+          <a:solidFill>
+            <a:srgbClr val="73174C"/>
+          </a:solidFill>
+          <a:ln>
+            <a:noFill/>
+          </a:ln>
+        </p:spPr>
+        <p:txBody>
+          <a:bodyPr spcFirstLastPara="1" wrap="square" lIns="91425" tIns="91425" rIns="91425" bIns="91425" anchor="ctr" anchorCtr="0">
+            <a:noAutofit/>
+          </a:bodyPr>
+          <a:lstStyle/>
+          <a:p>
+            <a:pPr marL="0" lvl="0" indent="0" algn="l" rtl="0">
+              <a:spcBef>
+                <a:spcPts val="0"/>
+              </a:spcBef>
+              <a:spcAft>
+                <a:spcPts val="0"/>
+              </a:spcAft>
+              <a:buClr>
+                <a:schemeClr val="dk1"/>
+              </a:buClr>
+              <a:buSzPts val="1100"/>
+              <a:buFont typeface="Arial"/>
+              <a:buNone/>
+            </a:pPr>
+            <a:r>
+              <a:rPr lang="en" sz="2500" b="1" dirty="0">
+                <a:solidFill>
+                  <a:schemeClr val="bg1"/>
+                </a:solidFill>
+                <a:latin typeface="Courier New" panose="02070309020205020404" pitchFamily="49" charset="0"/>
+                <a:cs typeface="Courier New" panose="02070309020205020404" pitchFamily="49" charset="0"/>
+              </a:rPr>
+              <a:t>Dashboard Details</a:t>
+            </a:r>
+            <a:endParaRPr sz="2500" b="1" dirty="0">
+              <a:solidFill>
+                <a:schemeClr val="bg1"/>
+              </a:solidFill>
+              <a:latin typeface="Courier New" panose="02070309020205020404" pitchFamily="49" charset="0"/>
+              <a:cs typeface="Courier New" panose="02070309020205020404" pitchFamily="49" charset="0"/>
+            </a:endParaRPr>
+          </a:p>
+        </p:txBody>
+      </p:sp>
+      <p:sp>
+        <p:nvSpPr>
+          <p:cNvPr id="87" name="Google Shape;87;p18"/>
+          <p:cNvSpPr txBox="1">
+            <a:spLocks noGrp="1"/>
+          </p:cNvSpPr>
+          <p:nvPr>
+            <p:ph type="body" idx="1"/>
+          </p:nvPr>
+        </p:nvSpPr>
+        <p:spPr>
+          <a:xfrm>
+            <a:off x="940309" y="1053103"/>
+            <a:ext cx="7263382" cy="3416400"/>
+          </a:xfrm>
+          <a:prstGeom prst="rect">
+            <a:avLst/>
+          </a:prstGeom>
+        </p:spPr>
+        <p:txBody>
+          <a:bodyPr spcFirstLastPara="1" wrap="square" lIns="91425" tIns="91425" rIns="91425" bIns="91425" anchor="t" anchorCtr="0">
+            <a:normAutofit/>
+          </a:bodyPr>
+          <a:lstStyle/>
+          <a:p>
+            <a:pPr marL="0" lvl="0" indent="0" algn="l" rtl="0">
+              <a:spcBef>
+                <a:spcPts val="0"/>
+              </a:spcBef>
+              <a:spcAft>
+                <a:spcPts val="0"/>
+              </a:spcAft>
+              <a:buNone/>
+            </a:pPr>
+            <a:r>
+              <a:rPr lang="en" b="1" dirty="0">
+                <a:solidFill>
+                  <a:schemeClr val="dk1"/>
+                </a:solidFill>
+              </a:rPr>
+              <a:t>Tools:</a:t>
+            </a:r>
+            <a:endParaRPr b="1" dirty="0">
+              <a:solidFill>
+                <a:schemeClr val="dk1"/>
+              </a:solidFill>
+            </a:endParaRPr>
+          </a:p>
+          <a:p>
+            <a:pPr marL="457200" lvl="0" indent="-342900" algn="l" rtl="0">
+              <a:spcBef>
+                <a:spcPts val="1200"/>
+              </a:spcBef>
+              <a:spcAft>
+                <a:spcPts val="0"/>
+              </a:spcAft>
+              <a:buClr>
+                <a:schemeClr val="dk1"/>
+              </a:buClr>
+              <a:buSzPts val="1800"/>
+              <a:buChar char="❖"/>
+            </a:pPr>
+            <a:r>
+              <a:rPr lang="en" sz="1600" b="1" dirty="0">
+                <a:solidFill>
+                  <a:schemeClr val="dk1"/>
+                </a:solidFill>
+              </a:rPr>
+              <a:t>Tableau </a:t>
+            </a:r>
+            <a:r>
+              <a:rPr lang="en" dirty="0">
+                <a:solidFill>
+                  <a:schemeClr val="dk1"/>
+                </a:solidFill>
+              </a:rPr>
+              <a:t>- </a:t>
+            </a:r>
+            <a:r>
+              <a:rPr lang="en" sz="1400" dirty="0">
+                <a:solidFill>
+                  <a:schemeClr val="dk1"/>
+                </a:solidFill>
+              </a:rPr>
+              <a:t>we will be using tableau for our data analysis visualization dashboard.</a:t>
+            </a:r>
+            <a:endParaRPr sz="1400" dirty="0">
+              <a:solidFill>
+                <a:schemeClr val="dk1"/>
+              </a:solidFill>
+            </a:endParaRPr>
+          </a:p>
+          <a:p>
+            <a:pPr marL="457200" lvl="0" indent="-342900" algn="l" rtl="0">
+              <a:spcBef>
+                <a:spcPts val="0"/>
+              </a:spcBef>
+              <a:spcAft>
+                <a:spcPts val="0"/>
+              </a:spcAft>
+              <a:buClr>
+                <a:schemeClr val="dk1"/>
+              </a:buClr>
+              <a:buSzPts val="1800"/>
+              <a:buChar char="❖"/>
+            </a:pPr>
+            <a:r>
+              <a:rPr lang="en" sz="1600" b="1" dirty="0">
+                <a:solidFill>
+                  <a:schemeClr val="dk1"/>
+                </a:solidFill>
+              </a:rPr>
+              <a:t>CSV Raw Data Files</a:t>
+            </a:r>
+            <a:r>
+              <a:rPr lang="en" sz="1400" dirty="0">
+                <a:solidFill>
+                  <a:schemeClr val="dk1"/>
+                </a:solidFill>
+              </a:rPr>
+              <a:t> </a:t>
+            </a:r>
+            <a:r>
+              <a:rPr lang="en" dirty="0">
+                <a:solidFill>
+                  <a:schemeClr val="dk1"/>
+                </a:solidFill>
+              </a:rPr>
+              <a:t>- </a:t>
+            </a:r>
+            <a:r>
+              <a:rPr lang="en" sz="1400" dirty="0">
+                <a:solidFill>
+                  <a:schemeClr val="dk1"/>
+                </a:solidFill>
+              </a:rPr>
+              <a:t>our data will be imported via csv files to utilize in our development of various interactive graphs and charts. </a:t>
+            </a:r>
+            <a:endParaRPr sz="1400" dirty="0">
+              <a:solidFill>
+                <a:schemeClr val="dk1"/>
+              </a:solidFill>
+            </a:endParaRPr>
+          </a:p>
+          <a:p>
+            <a:pPr marL="457200" lvl="0" indent="-330200" algn="l" rtl="0">
+              <a:spcBef>
+                <a:spcPts val="0"/>
+              </a:spcBef>
+              <a:spcAft>
+                <a:spcPts val="0"/>
+              </a:spcAft>
+              <a:buClr>
+                <a:schemeClr val="dk1"/>
+              </a:buClr>
+              <a:buSzPts val="1600"/>
+              <a:buChar char="❖"/>
+            </a:pPr>
+            <a:r>
+              <a:rPr lang="en" sz="1600" b="1" dirty="0">
+                <a:solidFill>
+                  <a:schemeClr val="dk1"/>
+                </a:solidFill>
+              </a:rPr>
+              <a:t>Machine Learning Output </a:t>
+            </a:r>
+            <a:r>
+              <a:rPr lang="en" sz="1600" dirty="0">
+                <a:solidFill>
+                  <a:schemeClr val="dk1"/>
+                </a:solidFill>
+              </a:rPr>
+              <a:t>- </a:t>
+            </a:r>
+            <a:r>
+              <a:rPr lang="en" sz="1400" dirty="0">
+                <a:solidFill>
+                  <a:schemeClr val="dk1"/>
+                </a:solidFill>
+              </a:rPr>
+              <a:t>the machine learning output will be saved as a csv file and imported into Tableau.</a:t>
+            </a:r>
+            <a:endParaRPr sz="1400" dirty="0">
+              <a:solidFill>
+                <a:schemeClr val="dk1"/>
+              </a:solidFill>
+            </a:endParaRPr>
+          </a:p>
+        </p:txBody>
+      </p:sp>
+    </p:spTree>
+  </p:cSld>
+  <p:clrMapOvr>
+    <a:masterClrMapping/>
+  </p:clrMapOvr>
+</p:sld>
+</file>
+
+<file path=ppt/slides/slide15.xml><?xml version="1.0" encoding="utf-8"?>
+<p:sld xmlns:a="http://schemas.openxmlformats.org/drawingml/2006/main" xmlns:r="http://schemas.openxmlformats.org/officeDocument/2006/relationships" xmlns:p="http://schemas.openxmlformats.org/presentationml/2006/main">
+  <p:cSld>
+    <p:spTree>
+      <p:nvGrpSpPr>
+        <p:cNvPr id="1" name="Shape 85"/>
+        <p:cNvGrpSpPr/>
+        <p:nvPr/>
+      </p:nvGrpSpPr>
+      <p:grpSpPr>
+        <a:xfrm>
+          <a:off x="0" y="0"/>
+          <a:ext cx="0" cy="0"/>
+          <a:chOff x="0" y="0"/>
+          <a:chExt cx="0" cy="0"/>
+        </a:xfrm>
+      </p:grpSpPr>
+      <p:sp>
+        <p:nvSpPr>
+          <p:cNvPr id="86" name="Google Shape;86;p18"/>
+          <p:cNvSpPr/>
+          <p:nvPr/>
+        </p:nvSpPr>
+        <p:spPr>
+          <a:xfrm>
+            <a:off x="0" y="0"/>
+            <a:ext cx="9144000" cy="463800"/>
+          </a:xfrm>
+          <a:prstGeom prst="rect">
+            <a:avLst/>
+          </a:prstGeom>
+          <a:solidFill>
+            <a:srgbClr val="73174C"/>
+          </a:solidFill>
+          <a:ln>
+            <a:noFill/>
+          </a:ln>
+        </p:spPr>
+        <p:txBody>
+          <a:bodyPr spcFirstLastPara="1" wrap="square" lIns="91425" tIns="91425" rIns="91425" bIns="91425" anchor="ctr" anchorCtr="0">
+            <a:noAutofit/>
+          </a:bodyPr>
+          <a:lstStyle/>
+          <a:p>
+            <a:pPr marL="0" lvl="0" indent="0" algn="l" rtl="0">
+              <a:spcBef>
+                <a:spcPts val="0"/>
+              </a:spcBef>
+              <a:spcAft>
+                <a:spcPts val="0"/>
+              </a:spcAft>
+              <a:buClr>
+                <a:schemeClr val="dk1"/>
+              </a:buClr>
+              <a:buSzPts val="1100"/>
+              <a:buFont typeface="Arial"/>
+              <a:buNone/>
+            </a:pPr>
+            <a:r>
+              <a:rPr lang="en" sz="2500" b="1" dirty="0">
+                <a:solidFill>
+                  <a:schemeClr val="bg1"/>
+                </a:solidFill>
+                <a:latin typeface="Courier New" panose="02070309020205020404" pitchFamily="49" charset="0"/>
+                <a:cs typeface="Courier New" panose="02070309020205020404" pitchFamily="49" charset="0"/>
+              </a:rPr>
+              <a:t>Dashboard Details</a:t>
+            </a:r>
+            <a:endParaRPr sz="2500" b="1" dirty="0">
+              <a:solidFill>
+                <a:schemeClr val="bg1"/>
+              </a:solidFill>
+              <a:latin typeface="Courier New" panose="02070309020205020404" pitchFamily="49" charset="0"/>
+              <a:cs typeface="Courier New" panose="02070309020205020404" pitchFamily="49" charset="0"/>
+            </a:endParaRPr>
+          </a:p>
+        </p:txBody>
+      </p:sp>
+      <p:sp>
+        <p:nvSpPr>
+          <p:cNvPr id="88" name="Google Shape;88;p18"/>
+          <p:cNvSpPr txBox="1">
+            <a:spLocks noGrp="1"/>
+          </p:cNvSpPr>
+          <p:nvPr>
+            <p:ph type="body" idx="4294967295"/>
+          </p:nvPr>
+        </p:nvSpPr>
+        <p:spPr>
+          <a:xfrm>
+            <a:off x="198463" y="863550"/>
+            <a:ext cx="2373086" cy="3416400"/>
+          </a:xfrm>
+          <a:prstGeom prst="rect">
+            <a:avLst/>
+          </a:prstGeom>
+        </p:spPr>
+        <p:txBody>
+          <a:bodyPr spcFirstLastPara="1" wrap="square" lIns="91425" tIns="91425" rIns="91425" bIns="91425" anchor="t" anchorCtr="0">
+            <a:normAutofit fontScale="92500"/>
+          </a:bodyPr>
+          <a:lstStyle/>
+          <a:p>
+            <a:pPr marL="0" lvl="0" indent="0" algn="l" rtl="0">
+              <a:spcBef>
+                <a:spcPts val="0"/>
+              </a:spcBef>
+              <a:spcAft>
+                <a:spcPts val="0"/>
+              </a:spcAft>
+              <a:buNone/>
+            </a:pPr>
+            <a:r>
+              <a:rPr lang="en" b="1" dirty="0">
+                <a:solidFill>
+                  <a:schemeClr val="dk1"/>
+                </a:solidFill>
+              </a:rPr>
+              <a:t>Interactive Element:</a:t>
+            </a:r>
+            <a:endParaRPr b="1" dirty="0">
+              <a:solidFill>
+                <a:schemeClr val="dk1"/>
+              </a:solidFill>
+            </a:endParaRPr>
+          </a:p>
+          <a:p>
+            <a:pPr marL="457200" lvl="0" indent="-330200" algn="l" rtl="0">
+              <a:spcBef>
+                <a:spcPts val="1200"/>
+              </a:spcBef>
+              <a:spcAft>
+                <a:spcPts val="0"/>
+              </a:spcAft>
+              <a:buClr>
+                <a:schemeClr val="dk1"/>
+              </a:buClr>
+              <a:buSzPts val="1600"/>
+              <a:buChar char="❖"/>
+            </a:pPr>
+            <a:r>
+              <a:rPr lang="en" sz="1400" b="1" dirty="0">
+                <a:solidFill>
+                  <a:schemeClr val="dk1"/>
+                </a:solidFill>
+              </a:rPr>
+              <a:t>Scale Diagram </a:t>
+            </a:r>
+            <a:r>
+              <a:rPr lang="en" sz="1400" dirty="0">
+                <a:solidFill>
+                  <a:schemeClr val="dk1"/>
+                </a:solidFill>
+              </a:rPr>
+              <a:t>- this will be a diagram comparing how residual sugar levels provide to the sweetness vs dryness of a wine.</a:t>
+            </a:r>
+          </a:p>
+          <a:p>
+            <a:pPr marL="457200" lvl="0" indent="-330200" algn="l" rtl="0">
+              <a:spcBef>
+                <a:spcPts val="1200"/>
+              </a:spcBef>
+              <a:spcAft>
+                <a:spcPts val="0"/>
+              </a:spcAft>
+              <a:buClr>
+                <a:schemeClr val="dk1"/>
+              </a:buClr>
+              <a:buSzPts val="1600"/>
+              <a:buChar char="❖"/>
+            </a:pPr>
+            <a:r>
+              <a:rPr lang="en" sz="1400" b="1" dirty="0">
+                <a:solidFill>
+                  <a:schemeClr val="dk1"/>
+                </a:solidFill>
+              </a:rPr>
+              <a:t>Link to Dashboard:</a:t>
+            </a:r>
+            <a:r>
+              <a:rPr lang="en" sz="1400" dirty="0">
+                <a:solidFill>
+                  <a:schemeClr val="dk1"/>
+                </a:solidFill>
+              </a:rPr>
+              <a:t> </a:t>
+            </a:r>
+            <a:r>
+              <a:rPr lang="en-US" sz="1100" dirty="0">
+                <a:solidFill>
+                  <a:schemeClr val="dk1"/>
+                </a:solidFill>
+                <a:hlinkClick r:id="rId3"/>
+              </a:rPr>
+              <a:t>https://public.tableau.com/app/profile/mara.valenzuela8787/viz/WineQualityAnalysisDashboard/Dashboard1?publish=yes</a:t>
+            </a:r>
+            <a:endParaRPr lang="en" sz="1100" b="1" dirty="0">
+              <a:solidFill>
+                <a:schemeClr val="dk1"/>
+              </a:solidFill>
+            </a:endParaRPr>
+          </a:p>
+          <a:p>
+            <a:pPr marL="127000" lvl="0" indent="0" algn="l" rtl="0">
+              <a:spcBef>
+                <a:spcPts val="1200"/>
+              </a:spcBef>
+              <a:spcAft>
+                <a:spcPts val="0"/>
+              </a:spcAft>
+              <a:buClr>
+                <a:schemeClr val="dk1"/>
+              </a:buClr>
+              <a:buSzPts val="1600"/>
+              <a:buNone/>
+            </a:pPr>
+            <a:endParaRPr sz="1400" dirty="0">
+              <a:solidFill>
+                <a:schemeClr val="dk1"/>
+              </a:solidFill>
+            </a:endParaRPr>
+          </a:p>
+        </p:txBody>
+      </p:sp>
+      <p:pic>
+        <p:nvPicPr>
+          <p:cNvPr id="5" name="Picture 4">
+            <a:extLst>
+              <a:ext uri="{FF2B5EF4-FFF2-40B4-BE49-F238E27FC236}">
+                <a16:creationId xmlns:a16="http://schemas.microsoft.com/office/drawing/2014/main" id="{F831D0B1-1D10-48E2-8EBE-1A4BEB9C44F6}"/>
+              </a:ext>
+            </a:extLst>
+          </p:cNvPr>
+          <p:cNvPicPr>
+            <a:picLocks noChangeAspect="1"/>
+          </p:cNvPicPr>
+          <p:nvPr/>
+        </p:nvPicPr>
+        <p:blipFill>
+          <a:blip r:embed="rId4"/>
+          <a:stretch>
+            <a:fillRect/>
+          </a:stretch>
+        </p:blipFill>
+        <p:spPr>
+          <a:xfrm>
+            <a:off x="2743200" y="863550"/>
+            <a:ext cx="5947966" cy="3866821"/>
+          </a:xfrm>
+          <a:prstGeom prst="rect">
+            <a:avLst/>
+          </a:prstGeom>
+        </p:spPr>
+      </p:pic>
+    </p:spTree>
+    <p:extLst>
+      <p:ext uri="{BB962C8B-B14F-4D97-AF65-F5344CB8AC3E}">
+        <p14:creationId xmlns:p14="http://schemas.microsoft.com/office/powerpoint/2010/main" val="1917869905"/>
+      </p:ext>
+    </p:extLst>
+  </p:cSld>
+  <p:clrMapOvr>
+    <a:masterClrMapping/>
+  </p:clrMapOvr>
+</p:sld>
+</file>
+
+<file path=ppt/slides/slide16.xml><?xml version="1.0" encoding="utf-8"?>
+<p:sld xmlns:a="http://schemas.openxmlformats.org/drawingml/2006/main" xmlns:r="http://schemas.openxmlformats.org/officeDocument/2006/relationships" xmlns:p="http://schemas.openxmlformats.org/presentationml/2006/main">
+  <p:cSld>
+    <p:spTree>
+      <p:nvGrpSpPr>
+        <p:cNvPr id="1" name="Shape 85"/>
+        <p:cNvGrpSpPr/>
+        <p:nvPr/>
+      </p:nvGrpSpPr>
+      <p:grpSpPr>
+        <a:xfrm>
+          <a:off x="0" y="0"/>
+          <a:ext cx="0" cy="0"/>
+          <a:chOff x="0" y="0"/>
+          <a:chExt cx="0" cy="0"/>
+        </a:xfrm>
+      </p:grpSpPr>
+      <p:sp>
+        <p:nvSpPr>
+          <p:cNvPr id="86" name="Google Shape;86;p18"/>
+          <p:cNvSpPr/>
+          <p:nvPr/>
+        </p:nvSpPr>
+        <p:spPr>
+          <a:xfrm>
+            <a:off x="0" y="0"/>
+            <a:ext cx="9144000" cy="463800"/>
+          </a:xfrm>
+          <a:prstGeom prst="rect">
+            <a:avLst/>
+          </a:prstGeom>
+          <a:solidFill>
+            <a:srgbClr val="73174C"/>
+          </a:solidFill>
+          <a:ln>
+            <a:noFill/>
+          </a:ln>
+        </p:spPr>
+        <p:txBody>
+          <a:bodyPr spcFirstLastPara="1" wrap="square" lIns="91425" tIns="91425" rIns="91425" bIns="91425" anchor="ctr" anchorCtr="0">
+            <a:noAutofit/>
+          </a:bodyPr>
+          <a:lstStyle/>
+          <a:p>
+            <a:pPr marL="0" lvl="0" indent="0" algn="l" rtl="0">
+              <a:spcBef>
+                <a:spcPts val="0"/>
+              </a:spcBef>
+              <a:spcAft>
+                <a:spcPts val="0"/>
+              </a:spcAft>
+              <a:buClr>
+                <a:schemeClr val="dk1"/>
+              </a:buClr>
+              <a:buSzPts val="1100"/>
+              <a:buFont typeface="Arial"/>
+              <a:buNone/>
+            </a:pPr>
+            <a:r>
+              <a:rPr lang="en" sz="2500" b="1" dirty="0">
+                <a:solidFill>
+                  <a:schemeClr val="bg1"/>
+                </a:solidFill>
+                <a:latin typeface="Courier New" panose="02070309020205020404" pitchFamily="49" charset="0"/>
+                <a:cs typeface="Courier New" panose="02070309020205020404" pitchFamily="49" charset="0"/>
+              </a:rPr>
+              <a:t>Results of the Analysis</a:t>
+            </a:r>
+            <a:endParaRPr sz="2500" b="1" dirty="0">
+              <a:solidFill>
+                <a:schemeClr val="bg1"/>
+              </a:solidFill>
+              <a:latin typeface="Courier New" panose="02070309020205020404" pitchFamily="49" charset="0"/>
+              <a:cs typeface="Courier New" panose="02070309020205020404" pitchFamily="49" charset="0"/>
+            </a:endParaRPr>
+          </a:p>
+        </p:txBody>
+      </p:sp>
+      <p:sp>
+        <p:nvSpPr>
+          <p:cNvPr id="88" name="Google Shape;88;p18"/>
+          <p:cNvSpPr txBox="1">
+            <a:spLocks noGrp="1"/>
+          </p:cNvSpPr>
+          <p:nvPr>
+            <p:ph type="body" idx="4294967295"/>
+          </p:nvPr>
+        </p:nvSpPr>
+        <p:spPr>
+          <a:xfrm>
+            <a:off x="337456" y="754693"/>
+            <a:ext cx="8469087" cy="3416400"/>
+          </a:xfrm>
+          <a:prstGeom prst="rect">
+            <a:avLst/>
+          </a:prstGeom>
+        </p:spPr>
+        <p:txBody>
+          <a:bodyPr spcFirstLastPara="1" wrap="square" lIns="91425" tIns="91425" rIns="91425" bIns="91425" anchor="t" anchorCtr="0">
+            <a:normAutofit fontScale="92500" lnSpcReduction="10000"/>
+          </a:bodyPr>
+          <a:lstStyle/>
+          <a:p>
+            <a:pPr marL="457200" lvl="0" indent="-330200" algn="l" rtl="0">
+              <a:spcBef>
+                <a:spcPts val="1200"/>
+              </a:spcBef>
+              <a:spcAft>
+                <a:spcPts val="0"/>
+              </a:spcAft>
+              <a:buClr>
+                <a:schemeClr val="dk1"/>
+              </a:buClr>
+              <a:buSzPts val="1600"/>
+              <a:buChar char="❖"/>
+            </a:pPr>
+            <a:r>
+              <a:rPr lang="en" sz="1400" b="1" dirty="0">
+                <a:solidFill>
+                  <a:schemeClr val="dk1"/>
+                </a:solidFill>
+              </a:rPr>
+              <a:t>Overview: </a:t>
+            </a:r>
+            <a:r>
+              <a:rPr lang="en" sz="1400" dirty="0">
+                <a:solidFill>
+                  <a:schemeClr val="dk1"/>
+                </a:solidFill>
+              </a:rPr>
+              <a:t>We performed a machine learning model using logistic regression to predict the quality scores of red and white wine based on 11 characterstics, such as </a:t>
+            </a:r>
+            <a:r>
+              <a:rPr lang="en" sz="1400" i="1" dirty="0">
+                <a:solidFill>
+                  <a:schemeClr val="dk1"/>
+                </a:solidFill>
+              </a:rPr>
+              <a:t>fixed acidity, citric acid, alcohol, sulfure dioxide</a:t>
+            </a:r>
+            <a:r>
+              <a:rPr lang="en" sz="1400" dirty="0">
+                <a:solidFill>
+                  <a:schemeClr val="dk1"/>
+                </a:solidFill>
+              </a:rPr>
+              <a:t>. </a:t>
+            </a:r>
+            <a:endParaRPr lang="en" sz="1400" b="1" dirty="0">
+              <a:solidFill>
+                <a:schemeClr val="dk1"/>
+              </a:solidFill>
+            </a:endParaRPr>
+          </a:p>
+          <a:p>
+            <a:pPr marL="457200" lvl="0" indent="-330200" algn="l" rtl="0">
+              <a:spcBef>
+                <a:spcPts val="1200"/>
+              </a:spcBef>
+              <a:spcAft>
+                <a:spcPts val="0"/>
+              </a:spcAft>
+              <a:buClr>
+                <a:schemeClr val="dk1"/>
+              </a:buClr>
+              <a:buSzPts val="1600"/>
+              <a:buChar char="❖"/>
+            </a:pPr>
+            <a:r>
+              <a:rPr lang="en" sz="1400" b="1" dirty="0">
+                <a:solidFill>
+                  <a:schemeClr val="dk1"/>
+                </a:solidFill>
+              </a:rPr>
+              <a:t>Analysis: </a:t>
+            </a:r>
+            <a:r>
+              <a:rPr lang="en" sz="1400" dirty="0">
+                <a:solidFill>
+                  <a:schemeClr val="dk1"/>
+                </a:solidFill>
+              </a:rPr>
+              <a:t>T</a:t>
+            </a:r>
+            <a:r>
+              <a:rPr lang="en-US" sz="1400" dirty="0">
+                <a:solidFill>
+                  <a:schemeClr val="dk1"/>
+                </a:solidFill>
+              </a:rPr>
+              <a:t>he</a:t>
+            </a:r>
+            <a:r>
+              <a:rPr lang="en" sz="1400" dirty="0">
+                <a:solidFill>
+                  <a:schemeClr val="dk1"/>
+                </a:solidFill>
+              </a:rPr>
+              <a:t> result of our analysis based off the logistic regression model provided us with outcomes of quality scores. Our model prediction accuracy came out to be 0.54, which was a bit lower than what we expected. However, based on this accuracy score we can assume that the features within the dataset do not contribute greatly to the quality of wine. </a:t>
+            </a:r>
+          </a:p>
+          <a:p>
+            <a:pPr marL="127000" lvl="0" indent="0" algn="l" rtl="0">
+              <a:spcBef>
+                <a:spcPts val="1200"/>
+              </a:spcBef>
+              <a:spcAft>
+                <a:spcPts val="0"/>
+              </a:spcAft>
+              <a:buClr>
+                <a:schemeClr val="dk1"/>
+              </a:buClr>
+              <a:buSzPts val="1600"/>
+              <a:buNone/>
+            </a:pPr>
+            <a:endParaRPr lang="en" sz="1400" dirty="0">
+              <a:solidFill>
+                <a:schemeClr val="dk1"/>
+              </a:solidFill>
+            </a:endParaRPr>
+          </a:p>
+          <a:p>
+            <a:pPr marL="457200" lvl="0" indent="-330200" algn="l" rtl="0">
+              <a:spcBef>
+                <a:spcPts val="1200"/>
+              </a:spcBef>
+              <a:spcAft>
+                <a:spcPts val="0"/>
+              </a:spcAft>
+              <a:buClr>
+                <a:schemeClr val="dk1"/>
+              </a:buClr>
+              <a:buSzPts val="1600"/>
+              <a:buChar char="❖"/>
+            </a:pPr>
+            <a:endParaRPr lang="en" sz="1400" b="1" dirty="0">
+              <a:solidFill>
+                <a:schemeClr val="dk1"/>
+              </a:solidFill>
+            </a:endParaRPr>
+          </a:p>
+          <a:p>
+            <a:pPr marL="457200" lvl="0" indent="-330200" algn="l" rtl="0">
+              <a:spcBef>
+                <a:spcPts val="1200"/>
+              </a:spcBef>
+              <a:spcAft>
+                <a:spcPts val="0"/>
+              </a:spcAft>
+              <a:buClr>
+                <a:schemeClr val="dk1"/>
+              </a:buClr>
+              <a:buSzPts val="1600"/>
+              <a:buChar char="❖"/>
+            </a:pPr>
+            <a:endParaRPr lang="en" sz="1400" b="1" dirty="0">
+              <a:solidFill>
+                <a:schemeClr val="dk1"/>
+              </a:solidFill>
+            </a:endParaRPr>
+          </a:p>
+          <a:p>
+            <a:pPr marL="457200" lvl="0" indent="-330200" algn="l" rtl="0">
+              <a:spcBef>
+                <a:spcPts val="1200"/>
+              </a:spcBef>
+              <a:spcAft>
+                <a:spcPts val="0"/>
+              </a:spcAft>
+              <a:buClr>
+                <a:schemeClr val="dk1"/>
+              </a:buClr>
+              <a:buSzPts val="1600"/>
+              <a:buChar char="❖"/>
+            </a:pPr>
+            <a:r>
+              <a:rPr lang="en" sz="1400" b="1" dirty="0">
+                <a:solidFill>
+                  <a:schemeClr val="dk1"/>
+                </a:solidFill>
+              </a:rPr>
+              <a:t>Recommendation for Future Analysis: </a:t>
+            </a:r>
+            <a:r>
+              <a:rPr lang="en" sz="1400" dirty="0">
+                <a:solidFill>
+                  <a:schemeClr val="dk1"/>
+                </a:solidFill>
+              </a:rPr>
+              <a:t>Using SciKit Learns RandomForestRegressor as another model to potentially get a better accuracy score.</a:t>
+            </a:r>
+          </a:p>
+          <a:p>
+            <a:pPr marL="127000" lvl="0" indent="0" algn="l" rtl="0">
+              <a:spcBef>
+                <a:spcPts val="1200"/>
+              </a:spcBef>
+              <a:spcAft>
+                <a:spcPts val="0"/>
+              </a:spcAft>
+              <a:buClr>
+                <a:schemeClr val="dk1"/>
+              </a:buClr>
+              <a:buSzPts val="1600"/>
+              <a:buNone/>
+            </a:pPr>
+            <a:endParaRPr sz="1400" dirty="0">
+              <a:solidFill>
+                <a:schemeClr val="dk1"/>
+              </a:solidFill>
+            </a:endParaRPr>
+          </a:p>
+        </p:txBody>
+      </p:sp>
+      <p:pic>
+        <p:nvPicPr>
+          <p:cNvPr id="3" name="Picture 2">
+            <a:extLst>
+              <a:ext uri="{FF2B5EF4-FFF2-40B4-BE49-F238E27FC236}">
+                <a16:creationId xmlns:a16="http://schemas.microsoft.com/office/drawing/2014/main" id="{3341F8EF-A73A-4AEE-A823-6E513397B9DE}"/>
+              </a:ext>
+            </a:extLst>
+          </p:cNvPr>
+          <p:cNvPicPr>
+            <a:picLocks noChangeAspect="1"/>
+          </p:cNvPicPr>
+          <p:nvPr/>
+        </p:nvPicPr>
+        <p:blipFill>
+          <a:blip r:embed="rId3"/>
+          <a:stretch>
+            <a:fillRect/>
+          </a:stretch>
+        </p:blipFill>
+        <p:spPr>
+          <a:xfrm>
+            <a:off x="1984917" y="2571750"/>
+            <a:ext cx="5174166" cy="997430"/>
+          </a:xfrm>
+          <a:prstGeom prst="rect">
+            <a:avLst/>
+          </a:prstGeom>
+        </p:spPr>
+      </p:pic>
+    </p:spTree>
+    <p:extLst>
+      <p:ext uri="{BB962C8B-B14F-4D97-AF65-F5344CB8AC3E}">
+        <p14:creationId xmlns:p14="http://schemas.microsoft.com/office/powerpoint/2010/main" val="1183709804"/>
+      </p:ext>
+    </p:extLst>
+  </p:cSld>
+  <p:clrMapOvr>
+    <a:masterClrMapping/>
+  </p:clrMapOvr>
+</p:sld>
+</file>
+
 <file path=ppt/slides/slide2.xml><?xml version="1.0" encoding="utf-8"?>
 <p:sld xmlns:a="http://schemas.openxmlformats.org/drawingml/2006/main" xmlns:r="http://schemas.openxmlformats.org/officeDocument/2006/relationships" xmlns:p="http://schemas.openxmlformats.org/presentationml/2006/main">
   <p:cSld>
@@ -8174,7 +9321,7 @@
   <p:cSld>
     <p:spTree>
       <p:nvGrpSpPr>
-        <p:cNvPr id="1" name="Shape 85"/>
+        <p:cNvPr id="1" name=""/>
         <p:cNvGrpSpPr/>
         <p:nvPr/>
       </p:nvGrpSpPr>
@@ -8186,258 +9333,42 @@
           <a:chExt cx="0" cy="0"/>
         </a:xfrm>
       </p:grpSpPr>
-      <p:sp>
-        <p:nvSpPr>
-          <p:cNvPr id="86" name="Google Shape;86;p18"/>
-          <p:cNvSpPr/>
+      <p:pic>
+        <p:nvPicPr>
+          <p:cNvPr id="5" name="Picture 4">
+            <a:extLst>
+              <a:ext uri="{FF2B5EF4-FFF2-40B4-BE49-F238E27FC236}">
+                <a16:creationId xmlns:a16="http://schemas.microsoft.com/office/drawing/2014/main" id="{DBE449CB-CC1B-DD4D-852C-96D812F9FAED}"/>
+              </a:ext>
+            </a:extLst>
+          </p:cNvPr>
+          <p:cNvPicPr>
+            <a:picLocks noChangeAspect="1"/>
+          </p:cNvPicPr>
           <p:nvPr/>
-        </p:nvSpPr>
+        </p:nvPicPr>
+        <p:blipFill>
+          <a:blip r:embed="rId2"/>
+          <a:stretch>
+            <a:fillRect/>
+          </a:stretch>
+        </p:blipFill>
         <p:spPr>
           <a:xfrm>
-            <a:off x="0" y="0"/>
-            <a:ext cx="9144000" cy="463800"/>
-          </a:xfrm>
-          <a:prstGeom prst="rect">
-            <a:avLst/>
-          </a:prstGeom>
-          <a:solidFill>
-            <a:srgbClr val="73174C"/>
-          </a:solidFill>
-          <a:ln>
-            <a:noFill/>
-          </a:ln>
-        </p:spPr>
-        <p:txBody>
-          <a:bodyPr spcFirstLastPara="1" wrap="square" lIns="91425" tIns="91425" rIns="91425" bIns="91425" anchor="ctr" anchorCtr="0">
-            <a:noAutofit/>
-          </a:bodyPr>
-          <a:lstStyle/>
-          <a:p>
-            <a:pPr marL="0" lvl="0" indent="0" algn="l" rtl="0">
-              <a:spcBef>
-                <a:spcPts val="0"/>
-              </a:spcBef>
-              <a:spcAft>
-                <a:spcPts val="0"/>
-              </a:spcAft>
-              <a:buClr>
-                <a:schemeClr val="dk1"/>
-              </a:buClr>
-              <a:buSzPts val="1100"/>
-              <a:buFont typeface="Arial"/>
-              <a:buNone/>
-            </a:pPr>
-            <a:r>
-              <a:rPr lang="en" sz="2500" b="1" dirty="0">
-                <a:solidFill>
-                  <a:schemeClr val="bg1"/>
-                </a:solidFill>
-                <a:latin typeface="Courier New" panose="02070309020205020404" pitchFamily="49" charset="0"/>
-                <a:cs typeface="Courier New" panose="02070309020205020404" pitchFamily="49" charset="0"/>
-              </a:rPr>
-              <a:t>Dashboard Details</a:t>
-            </a:r>
-            <a:endParaRPr sz="2500" b="1" dirty="0">
-              <a:solidFill>
-                <a:schemeClr val="bg1"/>
-              </a:solidFill>
-              <a:latin typeface="Courier New" panose="02070309020205020404" pitchFamily="49" charset="0"/>
-              <a:cs typeface="Courier New" panose="02070309020205020404" pitchFamily="49" charset="0"/>
-            </a:endParaRPr>
-          </a:p>
-        </p:txBody>
-      </p:sp>
-      <p:sp>
-        <p:nvSpPr>
-          <p:cNvPr id="87" name="Google Shape;87;p18"/>
-          <p:cNvSpPr txBox="1">
-            <a:spLocks noGrp="1"/>
-          </p:cNvSpPr>
-          <p:nvPr>
-            <p:ph type="body" idx="1"/>
-          </p:nvPr>
-        </p:nvSpPr>
-        <p:spPr>
-          <a:xfrm>
-            <a:off x="940309" y="1053103"/>
-            <a:ext cx="7263382" cy="3416400"/>
+            <a:off x="1963972" y="329482"/>
+            <a:ext cx="5486400" cy="3657600"/>
           </a:xfrm>
           <a:prstGeom prst="rect">
             <a:avLst/>
           </a:prstGeom>
         </p:spPr>
-        <p:txBody>
-          <a:bodyPr spcFirstLastPara="1" wrap="square" lIns="91425" tIns="91425" rIns="91425" bIns="91425" anchor="t" anchorCtr="0">
-            <a:normAutofit/>
-          </a:bodyPr>
-          <a:lstStyle/>
-          <a:p>
-            <a:pPr marL="0" lvl="0" indent="0" algn="l" rtl="0">
-              <a:spcBef>
-                <a:spcPts val="0"/>
-              </a:spcBef>
-              <a:spcAft>
-                <a:spcPts val="0"/>
-              </a:spcAft>
-              <a:buNone/>
-            </a:pPr>
-            <a:r>
-              <a:rPr lang="en" b="1" dirty="0">
-                <a:solidFill>
-                  <a:schemeClr val="dk1"/>
-                </a:solidFill>
-              </a:rPr>
-              <a:t>Tools:</a:t>
-            </a:r>
-            <a:endParaRPr b="1" dirty="0">
-              <a:solidFill>
-                <a:schemeClr val="dk1"/>
-              </a:solidFill>
-            </a:endParaRPr>
-          </a:p>
-          <a:p>
-            <a:pPr marL="457200" lvl="0" indent="-342900" algn="l" rtl="0">
-              <a:spcBef>
-                <a:spcPts val="1200"/>
-              </a:spcBef>
-              <a:spcAft>
-                <a:spcPts val="0"/>
-              </a:spcAft>
-              <a:buClr>
-                <a:schemeClr val="dk1"/>
-              </a:buClr>
-              <a:buSzPts val="1800"/>
-              <a:buChar char="❖"/>
-            </a:pPr>
-            <a:r>
-              <a:rPr lang="en" sz="1600" b="1" dirty="0">
-                <a:solidFill>
-                  <a:schemeClr val="dk1"/>
-                </a:solidFill>
-              </a:rPr>
-              <a:t>Tableau </a:t>
-            </a:r>
-            <a:r>
-              <a:rPr lang="en" dirty="0">
-                <a:solidFill>
-                  <a:schemeClr val="dk1"/>
-                </a:solidFill>
-              </a:rPr>
-              <a:t>- </a:t>
-            </a:r>
-            <a:r>
-              <a:rPr lang="en" sz="1400" dirty="0">
-                <a:solidFill>
-                  <a:schemeClr val="dk1"/>
-                </a:solidFill>
-              </a:rPr>
-              <a:t>we will be using tableau for our data analysis visualization dashboard.</a:t>
-            </a:r>
-            <a:endParaRPr sz="1400" dirty="0">
-              <a:solidFill>
-                <a:schemeClr val="dk1"/>
-              </a:solidFill>
-            </a:endParaRPr>
-          </a:p>
-          <a:p>
-            <a:pPr marL="457200" lvl="0" indent="-342900" algn="l" rtl="0">
-              <a:spcBef>
-                <a:spcPts val="0"/>
-              </a:spcBef>
-              <a:spcAft>
-                <a:spcPts val="0"/>
-              </a:spcAft>
-              <a:buClr>
-                <a:schemeClr val="dk1"/>
-              </a:buClr>
-              <a:buSzPts val="1800"/>
-              <a:buChar char="❖"/>
-            </a:pPr>
-            <a:r>
-              <a:rPr lang="en" sz="1600" b="1" dirty="0">
-                <a:solidFill>
-                  <a:schemeClr val="dk1"/>
-                </a:solidFill>
-              </a:rPr>
-              <a:t>CSV Raw Data Files</a:t>
-            </a:r>
-            <a:r>
-              <a:rPr lang="en" sz="1400" dirty="0">
-                <a:solidFill>
-                  <a:schemeClr val="dk1"/>
-                </a:solidFill>
-              </a:rPr>
-              <a:t> </a:t>
-            </a:r>
-            <a:r>
-              <a:rPr lang="en" dirty="0">
-                <a:solidFill>
-                  <a:schemeClr val="dk1"/>
-                </a:solidFill>
-              </a:rPr>
-              <a:t>- </a:t>
-            </a:r>
-            <a:r>
-              <a:rPr lang="en" sz="1400" dirty="0">
-                <a:solidFill>
-                  <a:schemeClr val="dk1"/>
-                </a:solidFill>
-              </a:rPr>
-              <a:t>our data will be imported via csv files to utilize in our development of various interactive graphs and charts. </a:t>
-            </a:r>
-            <a:endParaRPr sz="1400" dirty="0">
-              <a:solidFill>
-                <a:schemeClr val="dk1"/>
-              </a:solidFill>
-            </a:endParaRPr>
-          </a:p>
-          <a:p>
-            <a:pPr marL="457200" lvl="0" indent="-330200" algn="l" rtl="0">
-              <a:spcBef>
-                <a:spcPts val="0"/>
-              </a:spcBef>
-              <a:spcAft>
-                <a:spcPts val="0"/>
-              </a:spcAft>
-              <a:buClr>
-                <a:schemeClr val="dk1"/>
-              </a:buClr>
-              <a:buSzPts val="1600"/>
-              <a:buChar char="❖"/>
-            </a:pPr>
-            <a:r>
-              <a:rPr lang="en" sz="1600" b="1" dirty="0">
-                <a:solidFill>
-                  <a:schemeClr val="dk1"/>
-                </a:solidFill>
-              </a:rPr>
-              <a:t>Machine Learning Output </a:t>
-            </a:r>
-            <a:r>
-              <a:rPr lang="en" sz="1600" dirty="0">
-                <a:solidFill>
-                  <a:schemeClr val="dk1"/>
-                </a:solidFill>
-              </a:rPr>
-              <a:t>- </a:t>
-            </a:r>
-            <a:r>
-              <a:rPr lang="en" sz="1400" dirty="0">
-                <a:solidFill>
-                  <a:schemeClr val="dk1"/>
-                </a:solidFill>
-              </a:rPr>
-              <a:t>the machine learning output will be saved as a csv file and imported into Tableau.</a:t>
-            </a:r>
-            <a:endParaRPr sz="1400" dirty="0">
-              <a:solidFill>
-                <a:schemeClr val="dk1"/>
-              </a:solidFill>
-            </a:endParaRPr>
-          </a:p>
-        </p:txBody>
-      </p:sp>
+      </p:pic>
     </p:spTree>
+    <p:extLst>
+      <p:ext uri="{BB962C8B-B14F-4D97-AF65-F5344CB8AC3E}">
+        <p14:creationId xmlns:p14="http://schemas.microsoft.com/office/powerpoint/2010/main" val="2793152"/>
+      </p:ext>
+    </p:extLst>
   </p:cSld>
   <p:clrMapOvr>
     <a:masterClrMapping/>
@@ -8450,7 +9381,7 @@
   <p:cSld>
     <p:spTree>
       <p:nvGrpSpPr>
-        <p:cNvPr id="1" name="Shape 85"/>
+        <p:cNvPr id="1" name=""/>
         <p:cNvGrpSpPr/>
         <p:nvPr/>
       </p:nvGrpSpPr>
@@ -8462,219 +9393,12 @@
           <a:chExt cx="0" cy="0"/>
         </a:xfrm>
       </p:grpSpPr>
-      <p:sp>
-        <p:nvSpPr>
-          <p:cNvPr id="86" name="Google Shape;86;p18"/>
-          <p:cNvSpPr/>
-          <p:nvPr/>
-        </p:nvSpPr>
-        <p:spPr>
-          <a:xfrm>
-            <a:off x="0" y="0"/>
-            <a:ext cx="9144000" cy="463800"/>
-          </a:xfrm>
-          <a:prstGeom prst="rect">
-            <a:avLst/>
-          </a:prstGeom>
-          <a:solidFill>
-            <a:srgbClr val="73174C"/>
-          </a:solidFill>
-          <a:ln>
-            <a:noFill/>
-          </a:ln>
-        </p:spPr>
-        <p:txBody>
-          <a:bodyPr spcFirstLastPara="1" wrap="square" lIns="91425" tIns="91425" rIns="91425" bIns="91425" anchor="ctr" anchorCtr="0">
-            <a:noAutofit/>
-          </a:bodyPr>
-          <a:lstStyle/>
-          <a:p>
-            <a:pPr marL="0" lvl="0" indent="0" algn="l" rtl="0">
-              <a:spcBef>
-                <a:spcPts val="0"/>
-              </a:spcBef>
-              <a:spcAft>
-                <a:spcPts val="0"/>
-              </a:spcAft>
-              <a:buClr>
-                <a:schemeClr val="dk1"/>
-              </a:buClr>
-              <a:buSzPts val="1100"/>
-              <a:buFont typeface="Arial"/>
-              <a:buNone/>
-            </a:pPr>
-            <a:r>
-              <a:rPr lang="en" sz="2500" b="1" dirty="0">
-                <a:solidFill>
-                  <a:schemeClr val="bg1"/>
-                </a:solidFill>
-                <a:latin typeface="Courier New" panose="02070309020205020404" pitchFamily="49" charset="0"/>
-                <a:cs typeface="Courier New" panose="02070309020205020404" pitchFamily="49" charset="0"/>
-              </a:rPr>
-              <a:t>Dashboard Details</a:t>
-            </a:r>
-            <a:endParaRPr sz="2500" b="1" dirty="0">
-              <a:solidFill>
-                <a:schemeClr val="bg1"/>
-              </a:solidFill>
-              <a:latin typeface="Courier New" panose="02070309020205020404" pitchFamily="49" charset="0"/>
-              <a:cs typeface="Courier New" panose="02070309020205020404" pitchFamily="49" charset="0"/>
-            </a:endParaRPr>
-          </a:p>
-        </p:txBody>
-      </p:sp>
-      <p:sp>
-        <p:nvSpPr>
-          <p:cNvPr id="88" name="Google Shape;88;p18"/>
-          <p:cNvSpPr txBox="1">
-            <a:spLocks noGrp="1"/>
-          </p:cNvSpPr>
-          <p:nvPr>
-            <p:ph type="body" idx="4294967295"/>
-          </p:nvPr>
-        </p:nvSpPr>
-        <p:spPr>
-          <a:xfrm>
-            <a:off x="198463" y="863550"/>
-            <a:ext cx="2373086" cy="3416400"/>
-          </a:xfrm>
-          <a:prstGeom prst="rect">
-            <a:avLst/>
-          </a:prstGeom>
-        </p:spPr>
-        <p:txBody>
-          <a:bodyPr spcFirstLastPara="1" wrap="square" lIns="91425" tIns="91425" rIns="91425" bIns="91425" anchor="t" anchorCtr="0">
-            <a:normAutofit fontScale="92500"/>
-          </a:bodyPr>
-          <a:lstStyle/>
-          <a:p>
-            <a:pPr marL="0" lvl="0" indent="0" algn="l" rtl="0">
-              <a:spcBef>
-                <a:spcPts val="0"/>
-              </a:spcBef>
-              <a:spcAft>
-                <a:spcPts val="0"/>
-              </a:spcAft>
-              <a:buNone/>
-            </a:pPr>
-            <a:r>
-              <a:rPr lang="en" b="1" dirty="0">
-                <a:solidFill>
-                  <a:schemeClr val="dk1"/>
-                </a:solidFill>
-              </a:rPr>
-              <a:t>Interactive Element:</a:t>
-            </a:r>
-            <a:endParaRPr b="1" dirty="0">
-              <a:solidFill>
-                <a:schemeClr val="dk1"/>
-              </a:solidFill>
-            </a:endParaRPr>
-          </a:p>
-          <a:p>
-            <a:pPr marL="457200" lvl="0" indent="-330200" algn="l" rtl="0">
-              <a:spcBef>
-                <a:spcPts val="1200"/>
-              </a:spcBef>
-              <a:spcAft>
-                <a:spcPts val="0"/>
-              </a:spcAft>
-              <a:buClr>
-                <a:schemeClr val="dk1"/>
-              </a:buClr>
-              <a:buSzPts val="1600"/>
-              <a:buChar char="❖"/>
-            </a:pPr>
-            <a:r>
-              <a:rPr lang="en" sz="1400" b="1" dirty="0">
-                <a:solidFill>
-                  <a:schemeClr val="dk1"/>
-                </a:solidFill>
-              </a:rPr>
-              <a:t>Scale Diagram </a:t>
-            </a:r>
-            <a:r>
-              <a:rPr lang="en" sz="1400" dirty="0">
-                <a:solidFill>
-                  <a:schemeClr val="dk1"/>
-                </a:solidFill>
-              </a:rPr>
-              <a:t>- this will be a diagram comparing how residual sugar levels provide to the sweetness vs dryness of a wine.</a:t>
-            </a:r>
-          </a:p>
-          <a:p>
-            <a:pPr marL="457200" lvl="0" indent="-330200" algn="l" rtl="0">
-              <a:spcBef>
-                <a:spcPts val="1200"/>
-              </a:spcBef>
-              <a:spcAft>
-                <a:spcPts val="0"/>
-              </a:spcAft>
-              <a:buClr>
-                <a:schemeClr val="dk1"/>
-              </a:buClr>
-              <a:buSzPts val="1600"/>
-              <a:buChar char="❖"/>
-            </a:pPr>
-            <a:r>
-              <a:rPr lang="en" sz="1400" b="1" dirty="0">
-                <a:solidFill>
-                  <a:schemeClr val="dk1"/>
-                </a:solidFill>
-              </a:rPr>
-              <a:t>Link to Dashboard:</a:t>
-            </a:r>
-            <a:r>
-              <a:rPr lang="en" sz="1400" dirty="0">
-                <a:solidFill>
-                  <a:schemeClr val="dk1"/>
-                </a:solidFill>
-              </a:rPr>
-              <a:t> </a:t>
-            </a:r>
-            <a:r>
-              <a:rPr lang="en-US" sz="1100" dirty="0">
-                <a:solidFill>
-                  <a:schemeClr val="dk1"/>
-                </a:solidFill>
-                <a:hlinkClick r:id="rId3"/>
-              </a:rPr>
-              <a:t>https://public.tableau.com/app/profile/mara.valenzuela8787/viz/WineQualityAnalysisDashboard/Dashboard1?publish=yes</a:t>
-            </a:r>
-            <a:endParaRPr lang="en" sz="1100" b="1" dirty="0">
-              <a:solidFill>
-                <a:schemeClr val="dk1"/>
-              </a:solidFill>
-            </a:endParaRPr>
-          </a:p>
-          <a:p>
-            <a:pPr marL="127000" lvl="0" indent="0" algn="l" rtl="0">
-              <a:spcBef>
-                <a:spcPts val="1200"/>
-              </a:spcBef>
-              <a:spcAft>
-                <a:spcPts val="0"/>
-              </a:spcAft>
-              <a:buClr>
-                <a:schemeClr val="dk1"/>
-              </a:buClr>
-              <a:buSzPts val="1600"/>
-              <a:buNone/>
-            </a:pPr>
-            <a:endParaRPr sz="1400" dirty="0">
-              <a:solidFill>
-                <a:schemeClr val="dk1"/>
-              </a:solidFill>
-            </a:endParaRPr>
-          </a:p>
-        </p:txBody>
-      </p:sp>
       <p:pic>
         <p:nvPicPr>
-          <p:cNvPr id="5" name="Picture 4">
+          <p:cNvPr id="3" name="Picture 2">
             <a:extLst>
               <a:ext uri="{FF2B5EF4-FFF2-40B4-BE49-F238E27FC236}">
-                <a16:creationId xmlns:a16="http://schemas.microsoft.com/office/drawing/2014/main" id="{F831D0B1-1D10-48E2-8EBE-1A4BEB9C44F6}"/>
+                <a16:creationId xmlns:a16="http://schemas.microsoft.com/office/drawing/2014/main" id="{1C6AA53E-8580-9C49-9433-517AD19F902A}"/>
               </a:ext>
             </a:extLst>
           </p:cNvPr>
@@ -8684,15 +9408,15 @@
           <p:nvPr/>
         </p:nvPicPr>
         <p:blipFill>
-          <a:blip r:embed="rId4"/>
+          <a:blip r:embed="rId2"/>
           <a:stretch>
             <a:fillRect/>
           </a:stretch>
         </p:blipFill>
         <p:spPr>
           <a:xfrm>
-            <a:off x="2743200" y="863550"/>
-            <a:ext cx="5947966" cy="3866821"/>
+            <a:off x="1773141" y="480557"/>
+            <a:ext cx="5486400" cy="3657600"/>
           </a:xfrm>
           <a:prstGeom prst="rect">
             <a:avLst/>
@@ -8702,7 +9426,7 @@
     </p:spTree>
     <p:extLst>
       <p:ext uri="{BB962C8B-B14F-4D97-AF65-F5344CB8AC3E}">
-        <p14:creationId xmlns:p14="http://schemas.microsoft.com/office/powerpoint/2010/main" val="1917869905"/>
+        <p14:creationId xmlns:p14="http://schemas.microsoft.com/office/powerpoint/2010/main" val="1561879045"/>
       </p:ext>
     </p:extLst>
   </p:cSld>
@@ -8717,7 +9441,7 @@
   <p:cSld>
     <p:spTree>
       <p:nvGrpSpPr>
-        <p:cNvPr id="1" name="Shape 85"/>
+        <p:cNvPr id="1" name=""/>
         <p:cNvGrpSpPr/>
         <p:nvPr/>
       </p:nvGrpSpPr>
@@ -8729,309 +9453,12 @@
           <a:chExt cx="0" cy="0"/>
         </a:xfrm>
       </p:grpSpPr>
-      <p:sp>
-        <p:nvSpPr>
-          <p:cNvPr id="86" name="Google Shape;86;p18"/>
-          <p:cNvSpPr/>
-          <p:nvPr/>
-        </p:nvSpPr>
-        <p:spPr>
-          <a:xfrm>
-            <a:off x="0" y="0"/>
-            <a:ext cx="9144000" cy="463800"/>
-          </a:xfrm>
-          <a:prstGeom prst="rect">
-            <a:avLst/>
-          </a:prstGeom>
-          <a:solidFill>
-            <a:srgbClr val="73174C"/>
-          </a:solidFill>
-          <a:ln>
-            <a:noFill/>
-          </a:ln>
-        </p:spPr>
-        <p:txBody>
-          <a:bodyPr spcFirstLastPara="1" wrap="square" lIns="91425" tIns="91425" rIns="91425" bIns="91425" anchor="ctr" anchorCtr="0">
-            <a:noAutofit/>
-          </a:bodyPr>
-          <a:lstStyle/>
-          <a:p>
-            <a:pPr marL="0" lvl="0" indent="0" algn="l" rtl="0">
-              <a:spcBef>
-                <a:spcPts val="0"/>
-              </a:spcBef>
-              <a:spcAft>
-                <a:spcPts val="0"/>
-              </a:spcAft>
-              <a:buClr>
-                <a:schemeClr val="dk1"/>
-              </a:buClr>
-              <a:buSzPts val="1100"/>
-              <a:buFont typeface="Arial"/>
-              <a:buNone/>
-            </a:pPr>
-            <a:r>
-              <a:rPr lang="en" sz="2500" b="1" dirty="0">
-                <a:solidFill>
-                  <a:schemeClr val="bg1"/>
-                </a:solidFill>
-                <a:latin typeface="Courier New" panose="02070309020205020404" pitchFamily="49" charset="0"/>
-                <a:cs typeface="Courier New" panose="02070309020205020404" pitchFamily="49" charset="0"/>
-              </a:rPr>
-              <a:t>Results of the Analysis</a:t>
-            </a:r>
-            <a:endParaRPr sz="2500" b="1" dirty="0">
-              <a:solidFill>
-                <a:schemeClr val="bg1"/>
-              </a:solidFill>
-              <a:latin typeface="Courier New" panose="02070309020205020404" pitchFamily="49" charset="0"/>
-              <a:cs typeface="Courier New" panose="02070309020205020404" pitchFamily="49" charset="0"/>
-            </a:endParaRPr>
-          </a:p>
-        </p:txBody>
-      </p:sp>
-      <p:sp>
-        <p:nvSpPr>
-          <p:cNvPr id="88" name="Google Shape;88;p18"/>
-          <p:cNvSpPr txBox="1">
-            <a:spLocks noGrp="1"/>
-          </p:cNvSpPr>
-          <p:nvPr>
-            <p:ph type="body" idx="4294967295"/>
-          </p:nvPr>
-        </p:nvSpPr>
-        <p:spPr>
-          <a:xfrm>
-            <a:off x="337456" y="754693"/>
-            <a:ext cx="8469087" cy="3416400"/>
-          </a:xfrm>
-          <a:prstGeom prst="rect">
-            <a:avLst/>
-          </a:prstGeom>
-        </p:spPr>
-        <p:txBody>
-          <a:bodyPr spcFirstLastPara="1" wrap="square" lIns="91425" tIns="91425" rIns="91425" bIns="91425" anchor="t" anchorCtr="0">
-            <a:normAutofit fontScale="92500" lnSpcReduction="10000"/>
-          </a:bodyPr>
-          <a:lstStyle/>
-          <a:p>
-            <a:pPr marL="457200" lvl="0" indent="-330200" algn="l" rtl="0">
-              <a:spcBef>
-                <a:spcPts val="1200"/>
-              </a:spcBef>
-              <a:spcAft>
-                <a:spcPts val="0"/>
-              </a:spcAft>
-              <a:buClr>
-                <a:schemeClr val="dk1"/>
-              </a:buClr>
-              <a:buSzPts val="1600"/>
-              <a:buChar char="❖"/>
-            </a:pPr>
-            <a:r>
-              <a:rPr lang="en" sz="1400" b="1" dirty="0">
-                <a:solidFill>
-                  <a:schemeClr val="dk1"/>
-                </a:solidFill>
-              </a:rPr>
-              <a:t>Overview: </a:t>
-            </a:r>
-            <a:r>
-              <a:rPr lang="en" sz="1400" dirty="0">
-                <a:solidFill>
-                  <a:schemeClr val="dk1"/>
-                </a:solidFill>
-              </a:rPr>
-              <a:t>We performed a machine learning model using logistic regression to predict the quality scores of red and white wine based on 11 characterstics, such as </a:t>
-            </a:r>
-            <a:r>
-              <a:rPr lang="en" sz="1400" i="1" dirty="0">
-                <a:solidFill>
-                  <a:schemeClr val="dk1"/>
-                </a:solidFill>
-              </a:rPr>
-              <a:t>fixed acidity, citric acid, alcohol, sulfure dioxide</a:t>
-            </a:r>
-            <a:r>
-              <a:rPr lang="en" sz="1400" dirty="0">
-                <a:solidFill>
-                  <a:schemeClr val="dk1"/>
-                </a:solidFill>
-              </a:rPr>
-              <a:t>. </a:t>
-            </a:r>
-            <a:endParaRPr lang="en" sz="1400" b="1" dirty="0">
-              <a:solidFill>
-                <a:schemeClr val="dk1"/>
-              </a:solidFill>
-            </a:endParaRPr>
-          </a:p>
-          <a:p>
-            <a:pPr marL="457200" lvl="0" indent="-330200" algn="l" rtl="0">
-              <a:spcBef>
-                <a:spcPts val="1200"/>
-              </a:spcBef>
-              <a:spcAft>
-                <a:spcPts val="0"/>
-              </a:spcAft>
-              <a:buClr>
-                <a:schemeClr val="dk1"/>
-              </a:buClr>
-              <a:buSzPts val="1600"/>
-              <a:buChar char="❖"/>
-            </a:pPr>
-            <a:r>
-              <a:rPr lang="en" sz="1400" b="1" dirty="0">
-                <a:solidFill>
-                  <a:schemeClr val="dk1"/>
-                </a:solidFill>
-              </a:rPr>
-              <a:t>Analysis: </a:t>
-            </a:r>
-            <a:r>
-              <a:rPr lang="en" sz="1400" dirty="0">
-                <a:solidFill>
-                  <a:schemeClr val="dk1"/>
-                </a:solidFill>
-              </a:rPr>
-              <a:t>T</a:t>
-            </a:r>
-            <a:r>
-              <a:rPr lang="en-US" sz="1400" dirty="0">
-                <a:solidFill>
-                  <a:schemeClr val="dk1"/>
-                </a:solidFill>
-              </a:rPr>
-              <a:t>he</a:t>
-            </a:r>
-            <a:r>
-              <a:rPr lang="en" sz="1400" dirty="0">
-                <a:solidFill>
-                  <a:schemeClr val="dk1"/>
-                </a:solidFill>
-              </a:rPr>
-              <a:t> result of our analysis based off the logistic regression model provided us with outcomes of quality scores. Our model prediction accuracy came out to be 0.54, which was a bit lower than what we expected. However, based on this accuracy score we can assume that the features within the dataset do not contribute greatly to the quality of wine. </a:t>
-            </a:r>
-          </a:p>
-          <a:p>
-            <a:pPr marL="127000" lvl="0" indent="0" algn="l" rtl="0">
-              <a:spcBef>
-                <a:spcPts val="1200"/>
-              </a:spcBef>
-              <a:spcAft>
-                <a:spcPts val="0"/>
-              </a:spcAft>
-              <a:buClr>
-                <a:schemeClr val="dk1"/>
-              </a:buClr>
-              <a:buSzPts val="1600"/>
-              <a:buNone/>
-            </a:pPr>
-            <a:endParaRPr lang="en" sz="1400" dirty="0">
-              <a:solidFill>
-                <a:schemeClr val="dk1"/>
-              </a:solidFill>
-            </a:endParaRPr>
-          </a:p>
-          <a:p>
-            <a:pPr marL="457200" lvl="0" indent="-330200" algn="l" rtl="0">
-              <a:spcBef>
-                <a:spcPts val="1200"/>
-              </a:spcBef>
-              <a:spcAft>
-                <a:spcPts val="0"/>
-              </a:spcAft>
-              <a:buClr>
-                <a:schemeClr val="dk1"/>
-              </a:buClr>
-              <a:buSzPts val="1600"/>
-              <a:buChar char="❖"/>
-            </a:pPr>
-            <a:endParaRPr lang="en" sz="1400" b="1" dirty="0">
-              <a:solidFill>
-                <a:schemeClr val="dk1"/>
-              </a:solidFill>
-            </a:endParaRPr>
-          </a:p>
-          <a:p>
-            <a:pPr marL="457200" lvl="0" indent="-330200" algn="l" rtl="0">
-              <a:spcBef>
-                <a:spcPts val="1200"/>
-              </a:spcBef>
-              <a:spcAft>
-                <a:spcPts val="0"/>
-              </a:spcAft>
-              <a:buClr>
-                <a:schemeClr val="dk1"/>
-              </a:buClr>
-              <a:buSzPts val="1600"/>
-              <a:buChar char="❖"/>
-            </a:pPr>
-            <a:endParaRPr lang="en" sz="1400" b="1" dirty="0">
-              <a:solidFill>
-                <a:schemeClr val="dk1"/>
-              </a:solidFill>
-            </a:endParaRPr>
-          </a:p>
-          <a:p>
-            <a:pPr marL="457200" lvl="0" indent="-330200" algn="l" rtl="0">
-              <a:spcBef>
-                <a:spcPts val="1200"/>
-              </a:spcBef>
-              <a:spcAft>
-                <a:spcPts val="0"/>
-              </a:spcAft>
-              <a:buClr>
-                <a:schemeClr val="dk1"/>
-              </a:buClr>
-              <a:buSzPts val="1600"/>
-              <a:buChar char="❖"/>
-            </a:pPr>
-            <a:r>
-              <a:rPr lang="en" sz="1400" b="1" dirty="0">
-                <a:solidFill>
-                  <a:schemeClr val="dk1"/>
-                </a:solidFill>
-              </a:rPr>
-              <a:t>Recommendation for Future Analysis: </a:t>
-            </a:r>
-            <a:r>
-              <a:rPr lang="en" sz="1400" dirty="0">
-                <a:solidFill>
-                  <a:schemeClr val="dk1"/>
-                </a:solidFill>
-              </a:rPr>
-              <a:t>Using SciKit Learns RandomForestRegressor as another model to potentially get a better accuracy score.</a:t>
-            </a:r>
-          </a:p>
-          <a:p>
-            <a:pPr marL="127000" lvl="0" indent="0" algn="l" rtl="0">
-              <a:spcBef>
-                <a:spcPts val="1200"/>
-              </a:spcBef>
-              <a:spcAft>
-                <a:spcPts val="0"/>
-              </a:spcAft>
-              <a:buClr>
-                <a:schemeClr val="dk1"/>
-              </a:buClr>
-              <a:buSzPts val="1600"/>
-              <a:buNone/>
-            </a:pPr>
-            <a:endParaRPr sz="1400" dirty="0">
-              <a:solidFill>
-                <a:schemeClr val="dk1"/>
-              </a:solidFill>
-            </a:endParaRPr>
-          </a:p>
-        </p:txBody>
-      </p:sp>
       <p:pic>
         <p:nvPicPr>
-          <p:cNvPr id="3" name="Picture 2">
+          <p:cNvPr id="5" name="Picture 4">
             <a:extLst>
               <a:ext uri="{FF2B5EF4-FFF2-40B4-BE49-F238E27FC236}">
-                <a16:creationId xmlns:a16="http://schemas.microsoft.com/office/drawing/2014/main" id="{3341F8EF-A73A-4AEE-A823-6E513397B9DE}"/>
+                <a16:creationId xmlns:a16="http://schemas.microsoft.com/office/drawing/2014/main" id="{77FB2A42-ECB4-3449-9AED-757F2A83F0D7}"/>
               </a:ext>
             </a:extLst>
           </p:cNvPr>
@@ -9041,15 +9468,15 @@
           <p:nvPr/>
         </p:nvPicPr>
         <p:blipFill>
-          <a:blip r:embed="rId3"/>
+          <a:blip r:embed="rId2"/>
           <a:stretch>
             <a:fillRect/>
           </a:stretch>
         </p:blipFill>
         <p:spPr>
           <a:xfrm>
-            <a:off x="1984917" y="2571750"/>
-            <a:ext cx="5174166" cy="997430"/>
+            <a:off x="1828800" y="456703"/>
+            <a:ext cx="5486400" cy="3657600"/>
           </a:xfrm>
           <a:prstGeom prst="rect">
             <a:avLst/>
@@ -9059,7 +9486,7 @@
     </p:spTree>
     <p:extLst>
       <p:ext uri="{BB962C8B-B14F-4D97-AF65-F5344CB8AC3E}">
-        <p14:creationId xmlns:p14="http://schemas.microsoft.com/office/powerpoint/2010/main" val="1183709804"/>
+        <p14:creationId xmlns:p14="http://schemas.microsoft.com/office/powerpoint/2010/main" val="35084597"/>
       </p:ext>
     </p:extLst>
   </p:cSld>

</xml_diff>